<commit_message>
Created a Gameboard and ImageTrackers for each of the positions on the gameboard
</commit_message>
<xml_diff>
--- a/Designs.pptx
+++ b/Designs.pptx
@@ -7,6 +7,7 @@
   <p:sldIdLst>
     <p:sldId id="256" r:id="rId2"/>
     <p:sldId id="257" r:id="rId3"/>
+    <p:sldId id="258" r:id="rId4"/>
   </p:sldIdLst>
   <p:sldSz cx="12192000" cy="6858000"/>
   <p:notesSz cx="6858000" cy="9144000"/>
@@ -105,6 +106,11 @@
       </a:defRPr>
     </a:lvl9pPr>
   </p:defaultTextStyle>
+  <p:extLst>
+    <p:ext uri="{EFAFB233-063F-42B5-8137-9DF3F51BA10A}">
+      <p15:sldGuideLst xmlns:p15="http://schemas.microsoft.com/office/powerpoint/2012/main"/>
+    </p:ext>
+  </p:extLst>
 </p:presentation>
 </file>
 
@@ -6986,6 +6992,2127 @@
 </p:sld>
 </file>
 
+<file path=ppt/slides/slide3.xml><?xml version="1.0" encoding="utf-8"?>
+<p:sld xmlns:a="http://schemas.openxmlformats.org/drawingml/2006/main" xmlns:r="http://schemas.openxmlformats.org/officeDocument/2006/relationships" xmlns:p="http://schemas.openxmlformats.org/presentationml/2006/main">
+  <p:cSld>
+    <p:spTree>
+      <p:nvGrpSpPr>
+        <p:cNvPr id="1" name=""/>
+        <p:cNvGrpSpPr/>
+        <p:nvPr/>
+      </p:nvGrpSpPr>
+      <p:grpSpPr>
+        <a:xfrm>
+          <a:off x="0" y="0"/>
+          <a:ext cx="0" cy="0"/>
+          <a:chOff x="0" y="0"/>
+          <a:chExt cx="0" cy="0"/>
+        </a:xfrm>
+      </p:grpSpPr>
+      <p:sp>
+        <p:nvSpPr>
+          <p:cNvPr id="28" name="Rectangle 27">
+            <a:extLst>
+              <a:ext uri="{FF2B5EF4-FFF2-40B4-BE49-F238E27FC236}">
+                <a16:creationId xmlns:a16="http://schemas.microsoft.com/office/drawing/2014/main" id="{E7DF48B0-45FD-409A-B51F-94B9D33D2BF4}"/>
+              </a:ext>
+            </a:extLst>
+          </p:cNvPr>
+          <p:cNvSpPr/>
+          <p:nvPr/>
+        </p:nvSpPr>
+        <p:spPr>
+          <a:xfrm>
+            <a:off x="651776" y="128188"/>
+            <a:ext cx="2777383" cy="1939895"/>
+          </a:xfrm>
+          <a:prstGeom prst="rect">
+            <a:avLst/>
+          </a:prstGeom>
+        </p:spPr>
+        <p:style>
+          <a:lnRef idx="2">
+            <a:schemeClr val="dk1">
+              <a:shade val="50000"/>
+            </a:schemeClr>
+          </a:lnRef>
+          <a:fillRef idx="1">
+            <a:schemeClr val="dk1"/>
+          </a:fillRef>
+          <a:effectRef idx="0">
+            <a:schemeClr val="dk1"/>
+          </a:effectRef>
+          <a:fontRef idx="minor">
+            <a:schemeClr val="lt1"/>
+          </a:fontRef>
+        </p:style>
+        <p:txBody>
+          <a:bodyPr rtlCol="0" anchor="ctr"/>
+          <a:lstStyle/>
+          <a:p>
+            <a:pPr algn="ctr"/>
+            <a:endParaRPr lang="en-GB"/>
+          </a:p>
+        </p:txBody>
+      </p:sp>
+      <p:sp>
+        <p:nvSpPr>
+          <p:cNvPr id="29" name="Rectangle 28">
+            <a:extLst>
+              <a:ext uri="{FF2B5EF4-FFF2-40B4-BE49-F238E27FC236}">
+                <a16:creationId xmlns:a16="http://schemas.microsoft.com/office/drawing/2014/main" id="{CB6B3212-3C95-4C29-A292-319DEA01FFDF}"/>
+              </a:ext>
+            </a:extLst>
+          </p:cNvPr>
+          <p:cNvSpPr/>
+          <p:nvPr/>
+        </p:nvSpPr>
+        <p:spPr>
+          <a:xfrm rot="10800000">
+            <a:off x="956232" y="255252"/>
+            <a:ext cx="510589" cy="711200"/>
+          </a:xfrm>
+          <a:prstGeom prst="rect">
+            <a:avLst/>
+          </a:prstGeom>
+        </p:spPr>
+        <p:style>
+          <a:lnRef idx="2">
+            <a:schemeClr val="accent2">
+              <a:shade val="50000"/>
+            </a:schemeClr>
+          </a:lnRef>
+          <a:fillRef idx="1">
+            <a:schemeClr val="accent2"/>
+          </a:fillRef>
+          <a:effectRef idx="0">
+            <a:schemeClr val="accent2"/>
+          </a:effectRef>
+          <a:fontRef idx="minor">
+            <a:schemeClr val="lt1"/>
+          </a:fontRef>
+        </p:style>
+        <p:txBody>
+          <a:bodyPr rtlCol="0" anchor="ctr"/>
+          <a:lstStyle/>
+          <a:p>
+            <a:pPr algn="ctr"/>
+            <a:r>
+              <a:rPr lang="en-GB"/>
+              <a:t>1</a:t>
+            </a:r>
+          </a:p>
+        </p:txBody>
+      </p:sp>
+      <p:sp>
+        <p:nvSpPr>
+          <p:cNvPr id="30" name="Rectangle 29">
+            <a:extLst>
+              <a:ext uri="{FF2B5EF4-FFF2-40B4-BE49-F238E27FC236}">
+                <a16:creationId xmlns:a16="http://schemas.microsoft.com/office/drawing/2014/main" id="{31DDC26F-8C7F-449D-84E1-F3165C108FB2}"/>
+              </a:ext>
+            </a:extLst>
+          </p:cNvPr>
+          <p:cNvSpPr/>
+          <p:nvPr/>
+        </p:nvSpPr>
+        <p:spPr>
+          <a:xfrm rot="10800000">
+            <a:off x="1785174" y="255252"/>
+            <a:ext cx="510589" cy="711200"/>
+          </a:xfrm>
+          <a:prstGeom prst="rect">
+            <a:avLst/>
+          </a:prstGeom>
+        </p:spPr>
+        <p:style>
+          <a:lnRef idx="2">
+            <a:schemeClr val="accent2">
+              <a:shade val="50000"/>
+            </a:schemeClr>
+          </a:lnRef>
+          <a:fillRef idx="1">
+            <a:schemeClr val="accent2"/>
+          </a:fillRef>
+          <a:effectRef idx="0">
+            <a:schemeClr val="accent2"/>
+          </a:effectRef>
+          <a:fontRef idx="minor">
+            <a:schemeClr val="lt1"/>
+          </a:fontRef>
+        </p:style>
+        <p:txBody>
+          <a:bodyPr rtlCol="0" anchor="ctr"/>
+          <a:lstStyle/>
+          <a:p>
+            <a:pPr algn="ctr"/>
+            <a:r>
+              <a:rPr lang="en-GB"/>
+              <a:t>2</a:t>
+            </a:r>
+          </a:p>
+        </p:txBody>
+      </p:sp>
+      <p:sp>
+        <p:nvSpPr>
+          <p:cNvPr id="32" name="Rectangle 31">
+            <a:extLst>
+              <a:ext uri="{FF2B5EF4-FFF2-40B4-BE49-F238E27FC236}">
+                <a16:creationId xmlns:a16="http://schemas.microsoft.com/office/drawing/2014/main" id="{5CC69E6D-5948-4811-8BA1-7D32D7ACF696}"/>
+              </a:ext>
+            </a:extLst>
+          </p:cNvPr>
+          <p:cNvSpPr/>
+          <p:nvPr/>
+        </p:nvSpPr>
+        <p:spPr>
+          <a:xfrm rot="10800000">
+            <a:off x="2614116" y="255252"/>
+            <a:ext cx="510589" cy="711200"/>
+          </a:xfrm>
+          <a:prstGeom prst="rect">
+            <a:avLst/>
+          </a:prstGeom>
+        </p:spPr>
+        <p:style>
+          <a:lnRef idx="2">
+            <a:schemeClr val="accent2">
+              <a:shade val="50000"/>
+            </a:schemeClr>
+          </a:lnRef>
+          <a:fillRef idx="1">
+            <a:schemeClr val="accent2"/>
+          </a:fillRef>
+          <a:effectRef idx="0">
+            <a:schemeClr val="accent2"/>
+          </a:effectRef>
+          <a:fontRef idx="minor">
+            <a:schemeClr val="lt1"/>
+          </a:fontRef>
+        </p:style>
+        <p:txBody>
+          <a:bodyPr rtlCol="0" anchor="ctr"/>
+          <a:lstStyle/>
+          <a:p>
+            <a:pPr algn="ctr"/>
+            <a:r>
+              <a:rPr lang="en-GB"/>
+              <a:t>3</a:t>
+            </a:r>
+          </a:p>
+        </p:txBody>
+      </p:sp>
+      <p:sp>
+        <p:nvSpPr>
+          <p:cNvPr id="33" name="Rectangle 32">
+            <a:extLst>
+              <a:ext uri="{FF2B5EF4-FFF2-40B4-BE49-F238E27FC236}">
+                <a16:creationId xmlns:a16="http://schemas.microsoft.com/office/drawing/2014/main" id="{45C7551A-2027-41A6-BA24-17F9F22C8431}"/>
+              </a:ext>
+            </a:extLst>
+          </p:cNvPr>
+          <p:cNvSpPr/>
+          <p:nvPr/>
+        </p:nvSpPr>
+        <p:spPr>
+          <a:xfrm>
+            <a:off x="956232" y="1245140"/>
+            <a:ext cx="510589" cy="711200"/>
+          </a:xfrm>
+          <a:prstGeom prst="rect">
+            <a:avLst/>
+          </a:prstGeom>
+        </p:spPr>
+        <p:style>
+          <a:lnRef idx="2">
+            <a:schemeClr val="accent1">
+              <a:shade val="50000"/>
+            </a:schemeClr>
+          </a:lnRef>
+          <a:fillRef idx="1">
+            <a:schemeClr val="accent1"/>
+          </a:fillRef>
+          <a:effectRef idx="0">
+            <a:schemeClr val="accent1"/>
+          </a:effectRef>
+          <a:fontRef idx="minor">
+            <a:schemeClr val="lt1"/>
+          </a:fontRef>
+        </p:style>
+        <p:txBody>
+          <a:bodyPr rtlCol="0" anchor="ctr"/>
+          <a:lstStyle/>
+          <a:p>
+            <a:pPr algn="ctr"/>
+            <a:r>
+              <a:rPr lang="en-GB"/>
+              <a:t>1</a:t>
+            </a:r>
+          </a:p>
+        </p:txBody>
+      </p:sp>
+      <p:sp>
+        <p:nvSpPr>
+          <p:cNvPr id="35" name="Rectangle 34">
+            <a:extLst>
+              <a:ext uri="{FF2B5EF4-FFF2-40B4-BE49-F238E27FC236}">
+                <a16:creationId xmlns:a16="http://schemas.microsoft.com/office/drawing/2014/main" id="{2E235CE5-EB15-4354-A11D-F9E8F3D0A0FA}"/>
+              </a:ext>
+            </a:extLst>
+          </p:cNvPr>
+          <p:cNvSpPr/>
+          <p:nvPr/>
+        </p:nvSpPr>
+        <p:spPr>
+          <a:xfrm>
+            <a:off x="1785174" y="1245140"/>
+            <a:ext cx="510589" cy="711200"/>
+          </a:xfrm>
+          <a:prstGeom prst="rect">
+            <a:avLst/>
+          </a:prstGeom>
+        </p:spPr>
+        <p:style>
+          <a:lnRef idx="2">
+            <a:schemeClr val="accent1">
+              <a:shade val="50000"/>
+            </a:schemeClr>
+          </a:lnRef>
+          <a:fillRef idx="1">
+            <a:schemeClr val="accent1"/>
+          </a:fillRef>
+          <a:effectRef idx="0">
+            <a:schemeClr val="accent1"/>
+          </a:effectRef>
+          <a:fontRef idx="minor">
+            <a:schemeClr val="lt1"/>
+          </a:fontRef>
+        </p:style>
+        <p:txBody>
+          <a:bodyPr rtlCol="0" anchor="ctr"/>
+          <a:lstStyle/>
+          <a:p>
+            <a:pPr algn="ctr"/>
+            <a:r>
+              <a:rPr lang="en-GB"/>
+              <a:t>2</a:t>
+            </a:r>
+          </a:p>
+        </p:txBody>
+      </p:sp>
+      <p:sp>
+        <p:nvSpPr>
+          <p:cNvPr id="36" name="Rectangle 35">
+            <a:extLst>
+              <a:ext uri="{FF2B5EF4-FFF2-40B4-BE49-F238E27FC236}">
+                <a16:creationId xmlns:a16="http://schemas.microsoft.com/office/drawing/2014/main" id="{E95E876A-46D1-4D3E-833B-2FF189A6A02A}"/>
+              </a:ext>
+            </a:extLst>
+          </p:cNvPr>
+          <p:cNvSpPr/>
+          <p:nvPr/>
+        </p:nvSpPr>
+        <p:spPr>
+          <a:xfrm>
+            <a:off x="2614116" y="1245140"/>
+            <a:ext cx="510589" cy="711200"/>
+          </a:xfrm>
+          <a:prstGeom prst="rect">
+            <a:avLst/>
+          </a:prstGeom>
+        </p:spPr>
+        <p:style>
+          <a:lnRef idx="2">
+            <a:schemeClr val="accent1">
+              <a:shade val="50000"/>
+            </a:schemeClr>
+          </a:lnRef>
+          <a:fillRef idx="1">
+            <a:schemeClr val="accent1"/>
+          </a:fillRef>
+          <a:effectRef idx="0">
+            <a:schemeClr val="accent1"/>
+          </a:effectRef>
+          <a:fontRef idx="minor">
+            <a:schemeClr val="lt1"/>
+          </a:fontRef>
+        </p:style>
+        <p:txBody>
+          <a:bodyPr rtlCol="0" anchor="ctr"/>
+          <a:lstStyle/>
+          <a:p>
+            <a:pPr algn="ctr"/>
+            <a:r>
+              <a:rPr lang="en-GB"/>
+              <a:t>3</a:t>
+            </a:r>
+          </a:p>
+        </p:txBody>
+      </p:sp>
+      <p:sp>
+        <p:nvSpPr>
+          <p:cNvPr id="2" name="Rectangle 1">
+            <a:extLst>
+              <a:ext uri="{FF2B5EF4-FFF2-40B4-BE49-F238E27FC236}">
+                <a16:creationId xmlns:a16="http://schemas.microsoft.com/office/drawing/2014/main" id="{23978E1D-8A81-45A3-8757-FC143407E951}"/>
+              </a:ext>
+            </a:extLst>
+          </p:cNvPr>
+          <p:cNvSpPr/>
+          <p:nvPr/>
+        </p:nvSpPr>
+        <p:spPr>
+          <a:xfrm>
+            <a:off x="2659689" y="1273322"/>
+            <a:ext cx="413742" cy="648834"/>
+          </a:xfrm>
+          <a:prstGeom prst="rect">
+            <a:avLst/>
+          </a:prstGeom>
+          <a:solidFill>
+            <a:schemeClr val="accent4">
+              <a:lumMod val="40000"/>
+              <a:lumOff val="60000"/>
+            </a:schemeClr>
+          </a:solidFill>
+        </p:spPr>
+        <p:style>
+          <a:lnRef idx="2">
+            <a:schemeClr val="accent4">
+              <a:shade val="50000"/>
+            </a:schemeClr>
+          </a:lnRef>
+          <a:fillRef idx="1">
+            <a:schemeClr val="accent4"/>
+          </a:fillRef>
+          <a:effectRef idx="0">
+            <a:schemeClr val="accent4"/>
+          </a:effectRef>
+          <a:fontRef idx="minor">
+            <a:schemeClr val="lt1"/>
+          </a:fontRef>
+        </p:style>
+        <p:txBody>
+          <a:bodyPr rtlCol="0" anchor="ctr"/>
+          <a:lstStyle/>
+          <a:p>
+            <a:pPr algn="ctr"/>
+            <a:r>
+              <a:rPr lang="en-GB" sz="800">
+                <a:solidFill>
+                  <a:schemeClr val="tx1"/>
+                </a:solidFill>
+              </a:rPr>
+              <a:t>Stoat</a:t>
+            </a:r>
+            <a:br>
+              <a:rPr lang="en-GB" sz="800">
+                <a:solidFill>
+                  <a:schemeClr val="tx1"/>
+                </a:solidFill>
+              </a:rPr>
+            </a:br>
+            <a:br>
+              <a:rPr lang="en-GB" sz="800">
+                <a:solidFill>
+                  <a:schemeClr val="tx1"/>
+                </a:solidFill>
+              </a:rPr>
+            </a:br>
+            <a:br>
+              <a:rPr lang="en-GB" sz="800">
+                <a:solidFill>
+                  <a:schemeClr val="tx1"/>
+                </a:solidFill>
+              </a:rPr>
+            </a:br>
+            <a:r>
+              <a:rPr lang="en-GB" sz="800">
+                <a:solidFill>
+                  <a:schemeClr val="tx1"/>
+                </a:solidFill>
+              </a:rPr>
+              <a:t>1     </a:t>
+            </a:r>
+            <a:r>
+              <a:rPr lang="en-GB" sz="800" b="1">
+                <a:solidFill>
+                  <a:srgbClr val="FF0000"/>
+                </a:solidFill>
+              </a:rPr>
+              <a:t>2</a:t>
+            </a:r>
+          </a:p>
+        </p:txBody>
+      </p:sp>
+      <p:sp>
+        <p:nvSpPr>
+          <p:cNvPr id="50" name="Rectangle 49">
+            <a:extLst>
+              <a:ext uri="{FF2B5EF4-FFF2-40B4-BE49-F238E27FC236}">
+                <a16:creationId xmlns:a16="http://schemas.microsoft.com/office/drawing/2014/main" id="{AE36AAFB-9035-450A-8B77-43F0F44B9607}"/>
+              </a:ext>
+            </a:extLst>
+          </p:cNvPr>
+          <p:cNvSpPr/>
+          <p:nvPr/>
+        </p:nvSpPr>
+        <p:spPr>
+          <a:xfrm>
+            <a:off x="651776" y="2060627"/>
+            <a:ext cx="2495372" cy="929269"/>
+          </a:xfrm>
+          <a:prstGeom prst="rect">
+            <a:avLst/>
+          </a:prstGeom>
+        </p:spPr>
+        <p:style>
+          <a:lnRef idx="2">
+            <a:schemeClr val="dk1"/>
+          </a:lnRef>
+          <a:fillRef idx="1">
+            <a:schemeClr val="lt1"/>
+          </a:fillRef>
+          <a:effectRef idx="0">
+            <a:schemeClr val="dk1"/>
+          </a:effectRef>
+          <a:fontRef idx="minor">
+            <a:schemeClr val="dk1"/>
+          </a:fontRef>
+        </p:style>
+        <p:txBody>
+          <a:bodyPr rtlCol="0" anchor="ctr"/>
+          <a:lstStyle/>
+          <a:p>
+            <a:pPr algn="ctr"/>
+            <a:r>
+              <a:rPr lang="en-GB"/>
+              <a:t>Have a Stoat in Blue_3 that has taken 1 damage (2 health instead of 3)</a:t>
+            </a:r>
+          </a:p>
+        </p:txBody>
+      </p:sp>
+      <p:sp>
+        <p:nvSpPr>
+          <p:cNvPr id="53" name="Rectangle 52">
+            <a:extLst>
+              <a:ext uri="{FF2B5EF4-FFF2-40B4-BE49-F238E27FC236}">
+                <a16:creationId xmlns:a16="http://schemas.microsoft.com/office/drawing/2014/main" id="{DBEE0C4F-638C-4691-8B9C-F65901BB3A11}"/>
+              </a:ext>
+            </a:extLst>
+          </p:cNvPr>
+          <p:cNvSpPr/>
+          <p:nvPr/>
+        </p:nvSpPr>
+        <p:spPr>
+          <a:xfrm>
+            <a:off x="4435448" y="128188"/>
+            <a:ext cx="2777383" cy="1939895"/>
+          </a:xfrm>
+          <a:prstGeom prst="rect">
+            <a:avLst/>
+          </a:prstGeom>
+        </p:spPr>
+        <p:style>
+          <a:lnRef idx="2">
+            <a:schemeClr val="dk1">
+              <a:shade val="50000"/>
+            </a:schemeClr>
+          </a:lnRef>
+          <a:fillRef idx="1">
+            <a:schemeClr val="dk1"/>
+          </a:fillRef>
+          <a:effectRef idx="0">
+            <a:schemeClr val="dk1"/>
+          </a:effectRef>
+          <a:fontRef idx="minor">
+            <a:schemeClr val="lt1"/>
+          </a:fontRef>
+        </p:style>
+        <p:txBody>
+          <a:bodyPr rtlCol="0" anchor="ctr"/>
+          <a:lstStyle/>
+          <a:p>
+            <a:pPr algn="ctr"/>
+            <a:endParaRPr lang="en-GB"/>
+          </a:p>
+        </p:txBody>
+      </p:sp>
+      <p:sp>
+        <p:nvSpPr>
+          <p:cNvPr id="64" name="Rectangle 63">
+            <a:extLst>
+              <a:ext uri="{FF2B5EF4-FFF2-40B4-BE49-F238E27FC236}">
+                <a16:creationId xmlns:a16="http://schemas.microsoft.com/office/drawing/2014/main" id="{01331D6F-23A7-411A-8FC8-DB5AC369CE5D}"/>
+              </a:ext>
+            </a:extLst>
+          </p:cNvPr>
+          <p:cNvSpPr/>
+          <p:nvPr/>
+        </p:nvSpPr>
+        <p:spPr>
+          <a:xfrm rot="10800000">
+            <a:off x="4739904" y="255252"/>
+            <a:ext cx="510589" cy="711200"/>
+          </a:xfrm>
+          <a:prstGeom prst="rect">
+            <a:avLst/>
+          </a:prstGeom>
+        </p:spPr>
+        <p:style>
+          <a:lnRef idx="2">
+            <a:schemeClr val="accent2">
+              <a:shade val="50000"/>
+            </a:schemeClr>
+          </a:lnRef>
+          <a:fillRef idx="1">
+            <a:schemeClr val="accent2"/>
+          </a:fillRef>
+          <a:effectRef idx="0">
+            <a:schemeClr val="accent2"/>
+          </a:effectRef>
+          <a:fontRef idx="minor">
+            <a:schemeClr val="lt1"/>
+          </a:fontRef>
+        </p:style>
+        <p:txBody>
+          <a:bodyPr rtlCol="0" anchor="ctr"/>
+          <a:lstStyle/>
+          <a:p>
+            <a:pPr algn="ctr"/>
+            <a:r>
+              <a:rPr lang="en-GB"/>
+              <a:t>1</a:t>
+            </a:r>
+          </a:p>
+        </p:txBody>
+      </p:sp>
+      <p:sp>
+        <p:nvSpPr>
+          <p:cNvPr id="71" name="Rectangle 70">
+            <a:extLst>
+              <a:ext uri="{FF2B5EF4-FFF2-40B4-BE49-F238E27FC236}">
+                <a16:creationId xmlns:a16="http://schemas.microsoft.com/office/drawing/2014/main" id="{F0C2202F-374A-47A8-88D3-0330E0348C0C}"/>
+              </a:ext>
+            </a:extLst>
+          </p:cNvPr>
+          <p:cNvSpPr/>
+          <p:nvPr/>
+        </p:nvSpPr>
+        <p:spPr>
+          <a:xfrm rot="10800000">
+            <a:off x="5568846" y="255252"/>
+            <a:ext cx="510589" cy="711200"/>
+          </a:xfrm>
+          <a:prstGeom prst="rect">
+            <a:avLst/>
+          </a:prstGeom>
+        </p:spPr>
+        <p:style>
+          <a:lnRef idx="2">
+            <a:schemeClr val="accent2">
+              <a:shade val="50000"/>
+            </a:schemeClr>
+          </a:lnRef>
+          <a:fillRef idx="1">
+            <a:schemeClr val="accent2"/>
+          </a:fillRef>
+          <a:effectRef idx="0">
+            <a:schemeClr val="accent2"/>
+          </a:effectRef>
+          <a:fontRef idx="minor">
+            <a:schemeClr val="lt1"/>
+          </a:fontRef>
+        </p:style>
+        <p:txBody>
+          <a:bodyPr rtlCol="0" anchor="ctr"/>
+          <a:lstStyle/>
+          <a:p>
+            <a:pPr algn="ctr"/>
+            <a:r>
+              <a:rPr lang="en-GB"/>
+              <a:t>2</a:t>
+            </a:r>
+          </a:p>
+        </p:txBody>
+      </p:sp>
+      <p:sp>
+        <p:nvSpPr>
+          <p:cNvPr id="72" name="Rectangle 71">
+            <a:extLst>
+              <a:ext uri="{FF2B5EF4-FFF2-40B4-BE49-F238E27FC236}">
+                <a16:creationId xmlns:a16="http://schemas.microsoft.com/office/drawing/2014/main" id="{5074312D-1892-4D3F-90D4-4B939BF75EF4}"/>
+              </a:ext>
+            </a:extLst>
+          </p:cNvPr>
+          <p:cNvSpPr/>
+          <p:nvPr/>
+        </p:nvSpPr>
+        <p:spPr>
+          <a:xfrm rot="10800000">
+            <a:off x="6397788" y="255252"/>
+            <a:ext cx="510589" cy="711200"/>
+          </a:xfrm>
+          <a:prstGeom prst="rect">
+            <a:avLst/>
+          </a:prstGeom>
+        </p:spPr>
+        <p:style>
+          <a:lnRef idx="2">
+            <a:schemeClr val="accent2">
+              <a:shade val="50000"/>
+            </a:schemeClr>
+          </a:lnRef>
+          <a:fillRef idx="1">
+            <a:schemeClr val="accent2"/>
+          </a:fillRef>
+          <a:effectRef idx="0">
+            <a:schemeClr val="accent2"/>
+          </a:effectRef>
+          <a:fontRef idx="minor">
+            <a:schemeClr val="lt1"/>
+          </a:fontRef>
+        </p:style>
+        <p:txBody>
+          <a:bodyPr rtlCol="0" anchor="ctr"/>
+          <a:lstStyle/>
+          <a:p>
+            <a:pPr algn="ctr"/>
+            <a:r>
+              <a:rPr lang="en-GB"/>
+              <a:t>3</a:t>
+            </a:r>
+          </a:p>
+        </p:txBody>
+      </p:sp>
+      <p:sp>
+        <p:nvSpPr>
+          <p:cNvPr id="73" name="Rectangle 72">
+            <a:extLst>
+              <a:ext uri="{FF2B5EF4-FFF2-40B4-BE49-F238E27FC236}">
+                <a16:creationId xmlns:a16="http://schemas.microsoft.com/office/drawing/2014/main" id="{33DD7602-A6AA-45BE-AC6C-A1CDEB4EF02A}"/>
+              </a:ext>
+            </a:extLst>
+          </p:cNvPr>
+          <p:cNvSpPr/>
+          <p:nvPr/>
+        </p:nvSpPr>
+        <p:spPr>
+          <a:xfrm>
+            <a:off x="4739904" y="1245140"/>
+            <a:ext cx="510589" cy="711200"/>
+          </a:xfrm>
+          <a:prstGeom prst="rect">
+            <a:avLst/>
+          </a:prstGeom>
+        </p:spPr>
+        <p:style>
+          <a:lnRef idx="2">
+            <a:schemeClr val="accent1">
+              <a:shade val="50000"/>
+            </a:schemeClr>
+          </a:lnRef>
+          <a:fillRef idx="1">
+            <a:schemeClr val="accent1"/>
+          </a:fillRef>
+          <a:effectRef idx="0">
+            <a:schemeClr val="accent1"/>
+          </a:effectRef>
+          <a:fontRef idx="minor">
+            <a:schemeClr val="lt1"/>
+          </a:fontRef>
+        </p:style>
+        <p:txBody>
+          <a:bodyPr rtlCol="0" anchor="ctr"/>
+          <a:lstStyle/>
+          <a:p>
+            <a:pPr algn="ctr"/>
+            <a:r>
+              <a:rPr lang="en-GB"/>
+              <a:t>1</a:t>
+            </a:r>
+          </a:p>
+        </p:txBody>
+      </p:sp>
+      <p:sp>
+        <p:nvSpPr>
+          <p:cNvPr id="74" name="Rectangle 73">
+            <a:extLst>
+              <a:ext uri="{FF2B5EF4-FFF2-40B4-BE49-F238E27FC236}">
+                <a16:creationId xmlns:a16="http://schemas.microsoft.com/office/drawing/2014/main" id="{895C4A0D-9097-493E-B229-0C211DC88C0F}"/>
+              </a:ext>
+            </a:extLst>
+          </p:cNvPr>
+          <p:cNvSpPr/>
+          <p:nvPr/>
+        </p:nvSpPr>
+        <p:spPr>
+          <a:xfrm>
+            <a:off x="5568846" y="1245140"/>
+            <a:ext cx="510589" cy="711200"/>
+          </a:xfrm>
+          <a:prstGeom prst="rect">
+            <a:avLst/>
+          </a:prstGeom>
+        </p:spPr>
+        <p:style>
+          <a:lnRef idx="2">
+            <a:schemeClr val="accent1">
+              <a:shade val="50000"/>
+            </a:schemeClr>
+          </a:lnRef>
+          <a:fillRef idx="1">
+            <a:schemeClr val="accent1"/>
+          </a:fillRef>
+          <a:effectRef idx="0">
+            <a:schemeClr val="accent1"/>
+          </a:effectRef>
+          <a:fontRef idx="minor">
+            <a:schemeClr val="lt1"/>
+          </a:fontRef>
+        </p:style>
+        <p:txBody>
+          <a:bodyPr rtlCol="0" anchor="ctr"/>
+          <a:lstStyle/>
+          <a:p>
+            <a:pPr algn="ctr"/>
+            <a:r>
+              <a:rPr lang="en-GB"/>
+              <a:t>2</a:t>
+            </a:r>
+          </a:p>
+        </p:txBody>
+      </p:sp>
+      <p:sp>
+        <p:nvSpPr>
+          <p:cNvPr id="75" name="Rectangle 74">
+            <a:extLst>
+              <a:ext uri="{FF2B5EF4-FFF2-40B4-BE49-F238E27FC236}">
+                <a16:creationId xmlns:a16="http://schemas.microsoft.com/office/drawing/2014/main" id="{B923554A-ED3D-4639-8EF6-588D5ACFC7A9}"/>
+              </a:ext>
+            </a:extLst>
+          </p:cNvPr>
+          <p:cNvSpPr/>
+          <p:nvPr/>
+        </p:nvSpPr>
+        <p:spPr>
+          <a:xfrm>
+            <a:off x="6397788" y="1245140"/>
+            <a:ext cx="510589" cy="711200"/>
+          </a:xfrm>
+          <a:prstGeom prst="rect">
+            <a:avLst/>
+          </a:prstGeom>
+        </p:spPr>
+        <p:style>
+          <a:lnRef idx="2">
+            <a:schemeClr val="accent1">
+              <a:shade val="50000"/>
+            </a:schemeClr>
+          </a:lnRef>
+          <a:fillRef idx="1">
+            <a:schemeClr val="accent1"/>
+          </a:fillRef>
+          <a:effectRef idx="0">
+            <a:schemeClr val="accent1"/>
+          </a:effectRef>
+          <a:fontRef idx="minor">
+            <a:schemeClr val="lt1"/>
+          </a:fontRef>
+        </p:style>
+        <p:txBody>
+          <a:bodyPr rtlCol="0" anchor="ctr"/>
+          <a:lstStyle/>
+          <a:p>
+            <a:pPr algn="ctr"/>
+            <a:r>
+              <a:rPr lang="en-GB"/>
+              <a:t>3</a:t>
+            </a:r>
+          </a:p>
+        </p:txBody>
+      </p:sp>
+      <p:sp>
+        <p:nvSpPr>
+          <p:cNvPr id="77" name="Rectangle 76">
+            <a:extLst>
+              <a:ext uri="{FF2B5EF4-FFF2-40B4-BE49-F238E27FC236}">
+                <a16:creationId xmlns:a16="http://schemas.microsoft.com/office/drawing/2014/main" id="{5F463808-2A61-42EC-ABCD-F4DB5E365C08}"/>
+              </a:ext>
+            </a:extLst>
+          </p:cNvPr>
+          <p:cNvSpPr/>
+          <p:nvPr/>
+        </p:nvSpPr>
+        <p:spPr>
+          <a:xfrm>
+            <a:off x="3815346" y="1932103"/>
+            <a:ext cx="3690996" cy="1638894"/>
+          </a:xfrm>
+          <a:prstGeom prst="rect">
+            <a:avLst/>
+          </a:prstGeom>
+        </p:spPr>
+        <p:style>
+          <a:lnRef idx="2">
+            <a:schemeClr val="dk1"/>
+          </a:lnRef>
+          <a:fillRef idx="1">
+            <a:schemeClr val="lt1"/>
+          </a:fillRef>
+          <a:effectRef idx="0">
+            <a:schemeClr val="dk1"/>
+          </a:effectRef>
+          <a:fontRef idx="minor">
+            <a:schemeClr val="dk1"/>
+          </a:fontRef>
+        </p:style>
+        <p:txBody>
+          <a:bodyPr rtlCol="0" anchor="ctr"/>
+          <a:lstStyle/>
+          <a:p>
+            <a:pPr algn="ctr"/>
+            <a:r>
+              <a:rPr lang="en-GB"/>
+              <a:t>If that card is momentarily obstructed causing it to stop being tracked; we do not want to create a new ImageTracker as that will reset its state (full health); so keep its state in memory</a:t>
+            </a:r>
+          </a:p>
+        </p:txBody>
+      </p:sp>
+      <p:sp>
+        <p:nvSpPr>
+          <p:cNvPr id="79" name="Rectangle 78">
+            <a:extLst>
+              <a:ext uri="{FF2B5EF4-FFF2-40B4-BE49-F238E27FC236}">
+                <a16:creationId xmlns:a16="http://schemas.microsoft.com/office/drawing/2014/main" id="{8C3DB252-B99D-4E50-8554-BCAA678B53CB}"/>
+              </a:ext>
+            </a:extLst>
+          </p:cNvPr>
+          <p:cNvSpPr/>
+          <p:nvPr/>
+        </p:nvSpPr>
+        <p:spPr>
+          <a:xfrm>
+            <a:off x="8545975" y="128188"/>
+            <a:ext cx="2777383" cy="1939895"/>
+          </a:xfrm>
+          <a:prstGeom prst="rect">
+            <a:avLst/>
+          </a:prstGeom>
+        </p:spPr>
+        <p:style>
+          <a:lnRef idx="2">
+            <a:schemeClr val="dk1">
+              <a:shade val="50000"/>
+            </a:schemeClr>
+          </a:lnRef>
+          <a:fillRef idx="1">
+            <a:schemeClr val="dk1"/>
+          </a:fillRef>
+          <a:effectRef idx="0">
+            <a:schemeClr val="dk1"/>
+          </a:effectRef>
+          <a:fontRef idx="minor">
+            <a:schemeClr val="lt1"/>
+          </a:fontRef>
+        </p:style>
+        <p:txBody>
+          <a:bodyPr rtlCol="0" anchor="ctr"/>
+          <a:lstStyle/>
+          <a:p>
+            <a:pPr algn="ctr"/>
+            <a:endParaRPr lang="en-GB"/>
+          </a:p>
+        </p:txBody>
+      </p:sp>
+      <p:sp>
+        <p:nvSpPr>
+          <p:cNvPr id="80" name="Rectangle 79">
+            <a:extLst>
+              <a:ext uri="{FF2B5EF4-FFF2-40B4-BE49-F238E27FC236}">
+                <a16:creationId xmlns:a16="http://schemas.microsoft.com/office/drawing/2014/main" id="{6E031068-073D-4060-B47E-A14C421A4413}"/>
+              </a:ext>
+            </a:extLst>
+          </p:cNvPr>
+          <p:cNvSpPr/>
+          <p:nvPr/>
+        </p:nvSpPr>
+        <p:spPr>
+          <a:xfrm rot="10800000">
+            <a:off x="8850431" y="255252"/>
+            <a:ext cx="510589" cy="711200"/>
+          </a:xfrm>
+          <a:prstGeom prst="rect">
+            <a:avLst/>
+          </a:prstGeom>
+        </p:spPr>
+        <p:style>
+          <a:lnRef idx="2">
+            <a:schemeClr val="accent2">
+              <a:shade val="50000"/>
+            </a:schemeClr>
+          </a:lnRef>
+          <a:fillRef idx="1">
+            <a:schemeClr val="accent2"/>
+          </a:fillRef>
+          <a:effectRef idx="0">
+            <a:schemeClr val="accent2"/>
+          </a:effectRef>
+          <a:fontRef idx="minor">
+            <a:schemeClr val="lt1"/>
+          </a:fontRef>
+        </p:style>
+        <p:txBody>
+          <a:bodyPr rtlCol="0" anchor="ctr"/>
+          <a:lstStyle/>
+          <a:p>
+            <a:pPr algn="ctr"/>
+            <a:r>
+              <a:rPr lang="en-GB"/>
+              <a:t>1</a:t>
+            </a:r>
+          </a:p>
+        </p:txBody>
+      </p:sp>
+      <p:sp>
+        <p:nvSpPr>
+          <p:cNvPr id="81" name="Rectangle 80">
+            <a:extLst>
+              <a:ext uri="{FF2B5EF4-FFF2-40B4-BE49-F238E27FC236}">
+                <a16:creationId xmlns:a16="http://schemas.microsoft.com/office/drawing/2014/main" id="{B67B0C30-E124-46E3-9CBB-F3529E4B29AA}"/>
+              </a:ext>
+            </a:extLst>
+          </p:cNvPr>
+          <p:cNvSpPr/>
+          <p:nvPr/>
+        </p:nvSpPr>
+        <p:spPr>
+          <a:xfrm rot="10800000">
+            <a:off x="9679373" y="255252"/>
+            <a:ext cx="510589" cy="711200"/>
+          </a:xfrm>
+          <a:prstGeom prst="rect">
+            <a:avLst/>
+          </a:prstGeom>
+        </p:spPr>
+        <p:style>
+          <a:lnRef idx="2">
+            <a:schemeClr val="accent2">
+              <a:shade val="50000"/>
+            </a:schemeClr>
+          </a:lnRef>
+          <a:fillRef idx="1">
+            <a:schemeClr val="accent2"/>
+          </a:fillRef>
+          <a:effectRef idx="0">
+            <a:schemeClr val="accent2"/>
+          </a:effectRef>
+          <a:fontRef idx="minor">
+            <a:schemeClr val="lt1"/>
+          </a:fontRef>
+        </p:style>
+        <p:txBody>
+          <a:bodyPr rtlCol="0" anchor="ctr"/>
+          <a:lstStyle/>
+          <a:p>
+            <a:pPr algn="ctr"/>
+            <a:r>
+              <a:rPr lang="en-GB"/>
+              <a:t>2</a:t>
+            </a:r>
+          </a:p>
+        </p:txBody>
+      </p:sp>
+      <p:sp>
+        <p:nvSpPr>
+          <p:cNvPr id="82" name="Rectangle 81">
+            <a:extLst>
+              <a:ext uri="{FF2B5EF4-FFF2-40B4-BE49-F238E27FC236}">
+                <a16:creationId xmlns:a16="http://schemas.microsoft.com/office/drawing/2014/main" id="{0215A416-F1B9-49C1-84BE-8A1DB3989DF2}"/>
+              </a:ext>
+            </a:extLst>
+          </p:cNvPr>
+          <p:cNvSpPr/>
+          <p:nvPr/>
+        </p:nvSpPr>
+        <p:spPr>
+          <a:xfrm rot="10800000">
+            <a:off x="10508315" y="255252"/>
+            <a:ext cx="510589" cy="711200"/>
+          </a:xfrm>
+          <a:prstGeom prst="rect">
+            <a:avLst/>
+          </a:prstGeom>
+        </p:spPr>
+        <p:style>
+          <a:lnRef idx="2">
+            <a:schemeClr val="accent2">
+              <a:shade val="50000"/>
+            </a:schemeClr>
+          </a:lnRef>
+          <a:fillRef idx="1">
+            <a:schemeClr val="accent2"/>
+          </a:fillRef>
+          <a:effectRef idx="0">
+            <a:schemeClr val="accent2"/>
+          </a:effectRef>
+          <a:fontRef idx="minor">
+            <a:schemeClr val="lt1"/>
+          </a:fontRef>
+        </p:style>
+        <p:txBody>
+          <a:bodyPr rtlCol="0" anchor="ctr"/>
+          <a:lstStyle/>
+          <a:p>
+            <a:pPr algn="ctr"/>
+            <a:r>
+              <a:rPr lang="en-GB"/>
+              <a:t>3</a:t>
+            </a:r>
+          </a:p>
+        </p:txBody>
+      </p:sp>
+      <p:sp>
+        <p:nvSpPr>
+          <p:cNvPr id="83" name="Rectangle 82">
+            <a:extLst>
+              <a:ext uri="{FF2B5EF4-FFF2-40B4-BE49-F238E27FC236}">
+                <a16:creationId xmlns:a16="http://schemas.microsoft.com/office/drawing/2014/main" id="{AA50CEE0-E88C-4477-931B-E9EC7B66BF51}"/>
+              </a:ext>
+            </a:extLst>
+          </p:cNvPr>
+          <p:cNvSpPr/>
+          <p:nvPr/>
+        </p:nvSpPr>
+        <p:spPr>
+          <a:xfrm>
+            <a:off x="8850431" y="1245140"/>
+            <a:ext cx="510589" cy="711200"/>
+          </a:xfrm>
+          <a:prstGeom prst="rect">
+            <a:avLst/>
+          </a:prstGeom>
+        </p:spPr>
+        <p:style>
+          <a:lnRef idx="2">
+            <a:schemeClr val="accent1">
+              <a:shade val="50000"/>
+            </a:schemeClr>
+          </a:lnRef>
+          <a:fillRef idx="1">
+            <a:schemeClr val="accent1"/>
+          </a:fillRef>
+          <a:effectRef idx="0">
+            <a:schemeClr val="accent1"/>
+          </a:effectRef>
+          <a:fontRef idx="minor">
+            <a:schemeClr val="lt1"/>
+          </a:fontRef>
+        </p:style>
+        <p:txBody>
+          <a:bodyPr rtlCol="0" anchor="ctr"/>
+          <a:lstStyle/>
+          <a:p>
+            <a:pPr algn="ctr"/>
+            <a:r>
+              <a:rPr lang="en-GB"/>
+              <a:t>1</a:t>
+            </a:r>
+          </a:p>
+        </p:txBody>
+      </p:sp>
+      <p:sp>
+        <p:nvSpPr>
+          <p:cNvPr id="84" name="Rectangle 83">
+            <a:extLst>
+              <a:ext uri="{FF2B5EF4-FFF2-40B4-BE49-F238E27FC236}">
+                <a16:creationId xmlns:a16="http://schemas.microsoft.com/office/drawing/2014/main" id="{CF882A55-33DE-4543-B00E-1066E3CBF63B}"/>
+              </a:ext>
+            </a:extLst>
+          </p:cNvPr>
+          <p:cNvSpPr/>
+          <p:nvPr/>
+        </p:nvSpPr>
+        <p:spPr>
+          <a:xfrm>
+            <a:off x="9679373" y="1245140"/>
+            <a:ext cx="510589" cy="711200"/>
+          </a:xfrm>
+          <a:prstGeom prst="rect">
+            <a:avLst/>
+          </a:prstGeom>
+        </p:spPr>
+        <p:style>
+          <a:lnRef idx="2">
+            <a:schemeClr val="accent1">
+              <a:shade val="50000"/>
+            </a:schemeClr>
+          </a:lnRef>
+          <a:fillRef idx="1">
+            <a:schemeClr val="accent1"/>
+          </a:fillRef>
+          <a:effectRef idx="0">
+            <a:schemeClr val="accent1"/>
+          </a:effectRef>
+          <a:fontRef idx="minor">
+            <a:schemeClr val="lt1"/>
+          </a:fontRef>
+        </p:style>
+        <p:txBody>
+          <a:bodyPr rtlCol="0" anchor="ctr"/>
+          <a:lstStyle/>
+          <a:p>
+            <a:pPr algn="ctr"/>
+            <a:r>
+              <a:rPr lang="en-GB"/>
+              <a:t>2</a:t>
+            </a:r>
+          </a:p>
+        </p:txBody>
+      </p:sp>
+      <p:sp>
+        <p:nvSpPr>
+          <p:cNvPr id="85" name="Rectangle 84">
+            <a:extLst>
+              <a:ext uri="{FF2B5EF4-FFF2-40B4-BE49-F238E27FC236}">
+                <a16:creationId xmlns:a16="http://schemas.microsoft.com/office/drawing/2014/main" id="{49C7EF89-6801-459B-B4FF-205F697EC7E1}"/>
+              </a:ext>
+            </a:extLst>
+          </p:cNvPr>
+          <p:cNvSpPr/>
+          <p:nvPr/>
+        </p:nvSpPr>
+        <p:spPr>
+          <a:xfrm>
+            <a:off x="10508315" y="1245140"/>
+            <a:ext cx="510589" cy="711200"/>
+          </a:xfrm>
+          <a:prstGeom prst="rect">
+            <a:avLst/>
+          </a:prstGeom>
+        </p:spPr>
+        <p:style>
+          <a:lnRef idx="2">
+            <a:schemeClr val="accent1">
+              <a:shade val="50000"/>
+            </a:schemeClr>
+          </a:lnRef>
+          <a:fillRef idx="1">
+            <a:schemeClr val="accent1"/>
+          </a:fillRef>
+          <a:effectRef idx="0">
+            <a:schemeClr val="accent1"/>
+          </a:effectRef>
+          <a:fontRef idx="minor">
+            <a:schemeClr val="lt1"/>
+          </a:fontRef>
+        </p:style>
+        <p:txBody>
+          <a:bodyPr rtlCol="0" anchor="ctr"/>
+          <a:lstStyle/>
+          <a:p>
+            <a:pPr algn="ctr"/>
+            <a:r>
+              <a:rPr lang="en-GB"/>
+              <a:t>3</a:t>
+            </a:r>
+          </a:p>
+        </p:txBody>
+      </p:sp>
+      <p:sp>
+        <p:nvSpPr>
+          <p:cNvPr id="86" name="Rectangle 85">
+            <a:extLst>
+              <a:ext uri="{FF2B5EF4-FFF2-40B4-BE49-F238E27FC236}">
+                <a16:creationId xmlns:a16="http://schemas.microsoft.com/office/drawing/2014/main" id="{595DA579-1065-4ED8-A32D-8CEB8343A56E}"/>
+              </a:ext>
+            </a:extLst>
+          </p:cNvPr>
+          <p:cNvSpPr/>
+          <p:nvPr/>
+        </p:nvSpPr>
+        <p:spPr>
+          <a:xfrm>
+            <a:off x="10550518" y="1273322"/>
+            <a:ext cx="413742" cy="648834"/>
+          </a:xfrm>
+          <a:prstGeom prst="rect">
+            <a:avLst/>
+          </a:prstGeom>
+          <a:solidFill>
+            <a:schemeClr val="accent4">
+              <a:lumMod val="40000"/>
+              <a:lumOff val="60000"/>
+            </a:schemeClr>
+          </a:solidFill>
+        </p:spPr>
+        <p:style>
+          <a:lnRef idx="2">
+            <a:schemeClr val="accent4">
+              <a:shade val="50000"/>
+            </a:schemeClr>
+          </a:lnRef>
+          <a:fillRef idx="1">
+            <a:schemeClr val="accent4"/>
+          </a:fillRef>
+          <a:effectRef idx="0">
+            <a:schemeClr val="accent4"/>
+          </a:effectRef>
+          <a:fontRef idx="minor">
+            <a:schemeClr val="lt1"/>
+          </a:fontRef>
+        </p:style>
+        <p:txBody>
+          <a:bodyPr rtlCol="0" anchor="ctr"/>
+          <a:lstStyle/>
+          <a:p>
+            <a:pPr algn="ctr"/>
+            <a:r>
+              <a:rPr lang="en-GB" sz="800">
+                <a:solidFill>
+                  <a:schemeClr val="tx1"/>
+                </a:solidFill>
+              </a:rPr>
+              <a:t>Stoat</a:t>
+            </a:r>
+            <a:br>
+              <a:rPr lang="en-GB" sz="800">
+                <a:solidFill>
+                  <a:schemeClr val="tx1"/>
+                </a:solidFill>
+              </a:rPr>
+            </a:br>
+            <a:br>
+              <a:rPr lang="en-GB" sz="800">
+                <a:solidFill>
+                  <a:schemeClr val="tx1"/>
+                </a:solidFill>
+              </a:rPr>
+            </a:br>
+            <a:br>
+              <a:rPr lang="en-GB" sz="800">
+                <a:solidFill>
+                  <a:schemeClr val="tx1"/>
+                </a:solidFill>
+              </a:rPr>
+            </a:br>
+            <a:r>
+              <a:rPr lang="en-GB" sz="800">
+                <a:solidFill>
+                  <a:schemeClr val="tx1"/>
+                </a:solidFill>
+              </a:rPr>
+              <a:t>1     </a:t>
+            </a:r>
+            <a:r>
+              <a:rPr lang="en-GB" sz="800" b="1">
+                <a:solidFill>
+                  <a:srgbClr val="FF0000"/>
+                </a:solidFill>
+              </a:rPr>
+              <a:t>2</a:t>
+            </a:r>
+          </a:p>
+        </p:txBody>
+      </p:sp>
+      <p:cxnSp>
+        <p:nvCxnSpPr>
+          <p:cNvPr id="96" name="Straight Arrow Connector 95">
+            <a:extLst>
+              <a:ext uri="{FF2B5EF4-FFF2-40B4-BE49-F238E27FC236}">
+                <a16:creationId xmlns:a16="http://schemas.microsoft.com/office/drawing/2014/main" id="{43678653-D8BA-4BB5-A714-A12CB7C5BEC8}"/>
+              </a:ext>
+            </a:extLst>
+          </p:cNvPr>
+          <p:cNvCxnSpPr>
+            <a:cxnSpLocks/>
+          </p:cNvCxnSpPr>
+          <p:nvPr/>
+        </p:nvCxnSpPr>
+        <p:spPr>
+          <a:xfrm>
+            <a:off x="3073431" y="1140852"/>
+            <a:ext cx="1550556" cy="0"/>
+          </a:xfrm>
+          <a:prstGeom prst="straightConnector1">
+            <a:avLst/>
+          </a:prstGeom>
+          <a:ln w="76200">
+            <a:solidFill>
+              <a:srgbClr val="FF0000"/>
+            </a:solidFill>
+            <a:tailEnd type="triangle"/>
+          </a:ln>
+        </p:spPr>
+        <p:style>
+          <a:lnRef idx="1">
+            <a:schemeClr val="accent1"/>
+          </a:lnRef>
+          <a:fillRef idx="0">
+            <a:schemeClr val="accent1"/>
+          </a:fillRef>
+          <a:effectRef idx="0">
+            <a:schemeClr val="accent1"/>
+          </a:effectRef>
+          <a:fontRef idx="minor">
+            <a:schemeClr val="tx1"/>
+          </a:fontRef>
+        </p:style>
+      </p:cxnSp>
+      <p:cxnSp>
+        <p:nvCxnSpPr>
+          <p:cNvPr id="97" name="Straight Arrow Connector 96">
+            <a:extLst>
+              <a:ext uri="{FF2B5EF4-FFF2-40B4-BE49-F238E27FC236}">
+                <a16:creationId xmlns:a16="http://schemas.microsoft.com/office/drawing/2014/main" id="{343A367F-2C34-4321-8C3A-D3613852225D}"/>
+              </a:ext>
+            </a:extLst>
+          </p:cNvPr>
+          <p:cNvCxnSpPr>
+            <a:cxnSpLocks/>
+          </p:cNvCxnSpPr>
+          <p:nvPr/>
+        </p:nvCxnSpPr>
+        <p:spPr>
+          <a:xfrm>
+            <a:off x="7132219" y="1093839"/>
+            <a:ext cx="1550556" cy="0"/>
+          </a:xfrm>
+          <a:prstGeom prst="straightConnector1">
+            <a:avLst/>
+          </a:prstGeom>
+          <a:ln w="76200">
+            <a:solidFill>
+              <a:srgbClr val="FF0000"/>
+            </a:solidFill>
+            <a:tailEnd type="triangle"/>
+          </a:ln>
+        </p:spPr>
+        <p:style>
+          <a:lnRef idx="1">
+            <a:schemeClr val="accent1"/>
+          </a:lnRef>
+          <a:fillRef idx="0">
+            <a:schemeClr val="accent1"/>
+          </a:fillRef>
+          <a:effectRef idx="0">
+            <a:schemeClr val="accent1"/>
+          </a:effectRef>
+          <a:fontRef idx="minor">
+            <a:schemeClr val="tx1"/>
+          </a:fontRef>
+        </p:style>
+      </p:cxnSp>
+      <p:sp>
+        <p:nvSpPr>
+          <p:cNvPr id="78" name="Rectangle 77">
+            <a:extLst>
+              <a:ext uri="{FF2B5EF4-FFF2-40B4-BE49-F238E27FC236}">
+                <a16:creationId xmlns:a16="http://schemas.microsoft.com/office/drawing/2014/main" id="{1021D03E-713E-4ABB-9E79-845DDFF00557}"/>
+              </a:ext>
+            </a:extLst>
+          </p:cNvPr>
+          <p:cNvSpPr/>
+          <p:nvPr/>
+        </p:nvSpPr>
+        <p:spPr>
+          <a:xfrm>
+            <a:off x="7785219" y="1946368"/>
+            <a:ext cx="4406781" cy="1936572"/>
+          </a:xfrm>
+          <a:prstGeom prst="rect">
+            <a:avLst/>
+          </a:prstGeom>
+        </p:spPr>
+        <p:style>
+          <a:lnRef idx="2">
+            <a:schemeClr val="dk1"/>
+          </a:lnRef>
+          <a:fillRef idx="1">
+            <a:schemeClr val="lt1"/>
+          </a:fillRef>
+          <a:effectRef idx="0">
+            <a:schemeClr val="dk1"/>
+          </a:effectRef>
+          <a:fontRef idx="minor">
+            <a:schemeClr val="dk1"/>
+          </a:fontRef>
+        </p:style>
+        <p:txBody>
+          <a:bodyPr rtlCol="0" anchor="ctr"/>
+          <a:lstStyle/>
+          <a:p>
+            <a:pPr algn="ctr"/>
+            <a:r>
+              <a:rPr lang="en-GB"/>
+              <a:t>To do that simply remember each cards current state; and have a timer (eg 2 seconds), which activates if a card goes missing whilst having health &gt; 0.</a:t>
+            </a:r>
+            <a:br>
+              <a:rPr lang="en-GB"/>
+            </a:br>
+            <a:r>
+              <a:rPr lang="en-GB"/>
+              <a:t>If that card reappears in the same position before that timer expires; use the remembered state.</a:t>
+            </a:r>
+          </a:p>
+        </p:txBody>
+      </p:sp>
+      <p:sp>
+        <p:nvSpPr>
+          <p:cNvPr id="87" name="Rectangle 86">
+            <a:extLst>
+              <a:ext uri="{FF2B5EF4-FFF2-40B4-BE49-F238E27FC236}">
+                <a16:creationId xmlns:a16="http://schemas.microsoft.com/office/drawing/2014/main" id="{31AC1C7C-DE79-4181-9484-25FFE35E9B1C}"/>
+              </a:ext>
+            </a:extLst>
+          </p:cNvPr>
+          <p:cNvSpPr/>
+          <p:nvPr/>
+        </p:nvSpPr>
+        <p:spPr>
+          <a:xfrm>
+            <a:off x="5646372" y="5715017"/>
+            <a:ext cx="4033002" cy="986438"/>
+          </a:xfrm>
+          <a:prstGeom prst="rect">
+            <a:avLst/>
+          </a:prstGeom>
+        </p:spPr>
+        <p:style>
+          <a:lnRef idx="2">
+            <a:schemeClr val="dk1"/>
+          </a:lnRef>
+          <a:fillRef idx="1">
+            <a:schemeClr val="lt1"/>
+          </a:fillRef>
+          <a:effectRef idx="0">
+            <a:schemeClr val="dk1"/>
+          </a:effectRef>
+          <a:fontRef idx="minor">
+            <a:schemeClr val="dk1"/>
+          </a:fontRef>
+        </p:style>
+        <p:txBody>
+          <a:bodyPr rtlCol="0" anchor="ctr"/>
+          <a:lstStyle/>
+          <a:p>
+            <a:pPr algn="ctr"/>
+            <a:r>
+              <a:rPr lang="en-GB"/>
+              <a:t>Else the timer expires, destroy that card from memory and its ImageTracker (eg as it may have been sacrificed to play another card)</a:t>
+            </a:r>
+          </a:p>
+        </p:txBody>
+      </p:sp>
+      <p:sp>
+        <p:nvSpPr>
+          <p:cNvPr id="88" name="Rectangle 87">
+            <a:extLst>
+              <a:ext uri="{FF2B5EF4-FFF2-40B4-BE49-F238E27FC236}">
+                <a16:creationId xmlns:a16="http://schemas.microsoft.com/office/drawing/2014/main" id="{B67F214A-10A1-4EA3-8036-E135DA1A87E4}"/>
+              </a:ext>
+            </a:extLst>
+          </p:cNvPr>
+          <p:cNvSpPr/>
+          <p:nvPr/>
+        </p:nvSpPr>
+        <p:spPr>
+          <a:xfrm>
+            <a:off x="6265636" y="3623133"/>
+            <a:ext cx="2777383" cy="1939895"/>
+          </a:xfrm>
+          <a:prstGeom prst="rect">
+            <a:avLst/>
+          </a:prstGeom>
+        </p:spPr>
+        <p:style>
+          <a:lnRef idx="2">
+            <a:schemeClr val="dk1">
+              <a:shade val="50000"/>
+            </a:schemeClr>
+          </a:lnRef>
+          <a:fillRef idx="1">
+            <a:schemeClr val="dk1"/>
+          </a:fillRef>
+          <a:effectRef idx="0">
+            <a:schemeClr val="dk1"/>
+          </a:effectRef>
+          <a:fontRef idx="minor">
+            <a:schemeClr val="lt1"/>
+          </a:fontRef>
+        </p:style>
+        <p:txBody>
+          <a:bodyPr rtlCol="0" anchor="ctr"/>
+          <a:lstStyle/>
+          <a:p>
+            <a:pPr algn="ctr"/>
+            <a:endParaRPr lang="en-GB"/>
+          </a:p>
+        </p:txBody>
+      </p:sp>
+      <p:sp>
+        <p:nvSpPr>
+          <p:cNvPr id="89" name="Rectangle 88">
+            <a:extLst>
+              <a:ext uri="{FF2B5EF4-FFF2-40B4-BE49-F238E27FC236}">
+                <a16:creationId xmlns:a16="http://schemas.microsoft.com/office/drawing/2014/main" id="{1C9F7211-EA43-4D21-B3B1-86C5584029DD}"/>
+              </a:ext>
+            </a:extLst>
+          </p:cNvPr>
+          <p:cNvSpPr/>
+          <p:nvPr/>
+        </p:nvSpPr>
+        <p:spPr>
+          <a:xfrm rot="10800000">
+            <a:off x="6570092" y="3750197"/>
+            <a:ext cx="510589" cy="711200"/>
+          </a:xfrm>
+          <a:prstGeom prst="rect">
+            <a:avLst/>
+          </a:prstGeom>
+        </p:spPr>
+        <p:style>
+          <a:lnRef idx="2">
+            <a:schemeClr val="accent2">
+              <a:shade val="50000"/>
+            </a:schemeClr>
+          </a:lnRef>
+          <a:fillRef idx="1">
+            <a:schemeClr val="accent2"/>
+          </a:fillRef>
+          <a:effectRef idx="0">
+            <a:schemeClr val="accent2"/>
+          </a:effectRef>
+          <a:fontRef idx="minor">
+            <a:schemeClr val="lt1"/>
+          </a:fontRef>
+        </p:style>
+        <p:txBody>
+          <a:bodyPr rtlCol="0" anchor="ctr"/>
+          <a:lstStyle/>
+          <a:p>
+            <a:pPr algn="ctr"/>
+            <a:r>
+              <a:rPr lang="en-GB"/>
+              <a:t>1</a:t>
+            </a:r>
+          </a:p>
+        </p:txBody>
+      </p:sp>
+      <p:sp>
+        <p:nvSpPr>
+          <p:cNvPr id="90" name="Rectangle 89">
+            <a:extLst>
+              <a:ext uri="{FF2B5EF4-FFF2-40B4-BE49-F238E27FC236}">
+                <a16:creationId xmlns:a16="http://schemas.microsoft.com/office/drawing/2014/main" id="{A817C357-DFCA-4C2A-B4C3-47F05368F16D}"/>
+              </a:ext>
+            </a:extLst>
+          </p:cNvPr>
+          <p:cNvSpPr/>
+          <p:nvPr/>
+        </p:nvSpPr>
+        <p:spPr>
+          <a:xfrm rot="10800000">
+            <a:off x="7399034" y="3750197"/>
+            <a:ext cx="510589" cy="711200"/>
+          </a:xfrm>
+          <a:prstGeom prst="rect">
+            <a:avLst/>
+          </a:prstGeom>
+        </p:spPr>
+        <p:style>
+          <a:lnRef idx="2">
+            <a:schemeClr val="accent2">
+              <a:shade val="50000"/>
+            </a:schemeClr>
+          </a:lnRef>
+          <a:fillRef idx="1">
+            <a:schemeClr val="accent2"/>
+          </a:fillRef>
+          <a:effectRef idx="0">
+            <a:schemeClr val="accent2"/>
+          </a:effectRef>
+          <a:fontRef idx="minor">
+            <a:schemeClr val="lt1"/>
+          </a:fontRef>
+        </p:style>
+        <p:txBody>
+          <a:bodyPr rtlCol="0" anchor="ctr"/>
+          <a:lstStyle/>
+          <a:p>
+            <a:pPr algn="ctr"/>
+            <a:r>
+              <a:rPr lang="en-GB"/>
+              <a:t>2</a:t>
+            </a:r>
+          </a:p>
+        </p:txBody>
+      </p:sp>
+      <p:sp>
+        <p:nvSpPr>
+          <p:cNvPr id="91" name="Rectangle 90">
+            <a:extLst>
+              <a:ext uri="{FF2B5EF4-FFF2-40B4-BE49-F238E27FC236}">
+                <a16:creationId xmlns:a16="http://schemas.microsoft.com/office/drawing/2014/main" id="{6095BAAC-2417-4C49-89E4-D0D680A89681}"/>
+              </a:ext>
+            </a:extLst>
+          </p:cNvPr>
+          <p:cNvSpPr/>
+          <p:nvPr/>
+        </p:nvSpPr>
+        <p:spPr>
+          <a:xfrm rot="10800000">
+            <a:off x="8227976" y="3750197"/>
+            <a:ext cx="510589" cy="711200"/>
+          </a:xfrm>
+          <a:prstGeom prst="rect">
+            <a:avLst/>
+          </a:prstGeom>
+        </p:spPr>
+        <p:style>
+          <a:lnRef idx="2">
+            <a:schemeClr val="accent2">
+              <a:shade val="50000"/>
+            </a:schemeClr>
+          </a:lnRef>
+          <a:fillRef idx="1">
+            <a:schemeClr val="accent2"/>
+          </a:fillRef>
+          <a:effectRef idx="0">
+            <a:schemeClr val="accent2"/>
+          </a:effectRef>
+          <a:fontRef idx="minor">
+            <a:schemeClr val="lt1"/>
+          </a:fontRef>
+        </p:style>
+        <p:txBody>
+          <a:bodyPr rtlCol="0" anchor="ctr"/>
+          <a:lstStyle/>
+          <a:p>
+            <a:pPr algn="ctr"/>
+            <a:r>
+              <a:rPr lang="en-GB"/>
+              <a:t>3</a:t>
+            </a:r>
+          </a:p>
+        </p:txBody>
+      </p:sp>
+      <p:sp>
+        <p:nvSpPr>
+          <p:cNvPr id="92" name="Rectangle 91">
+            <a:extLst>
+              <a:ext uri="{FF2B5EF4-FFF2-40B4-BE49-F238E27FC236}">
+                <a16:creationId xmlns:a16="http://schemas.microsoft.com/office/drawing/2014/main" id="{C2645325-BD6D-41D4-B7BF-C49BD530F052}"/>
+              </a:ext>
+            </a:extLst>
+          </p:cNvPr>
+          <p:cNvSpPr/>
+          <p:nvPr/>
+        </p:nvSpPr>
+        <p:spPr>
+          <a:xfrm>
+            <a:off x="6570092" y="4740085"/>
+            <a:ext cx="510589" cy="711200"/>
+          </a:xfrm>
+          <a:prstGeom prst="rect">
+            <a:avLst/>
+          </a:prstGeom>
+        </p:spPr>
+        <p:style>
+          <a:lnRef idx="2">
+            <a:schemeClr val="accent1">
+              <a:shade val="50000"/>
+            </a:schemeClr>
+          </a:lnRef>
+          <a:fillRef idx="1">
+            <a:schemeClr val="accent1"/>
+          </a:fillRef>
+          <a:effectRef idx="0">
+            <a:schemeClr val="accent1"/>
+          </a:effectRef>
+          <a:fontRef idx="minor">
+            <a:schemeClr val="lt1"/>
+          </a:fontRef>
+        </p:style>
+        <p:txBody>
+          <a:bodyPr rtlCol="0" anchor="ctr"/>
+          <a:lstStyle/>
+          <a:p>
+            <a:pPr algn="ctr"/>
+            <a:r>
+              <a:rPr lang="en-GB"/>
+              <a:t>1</a:t>
+            </a:r>
+          </a:p>
+        </p:txBody>
+      </p:sp>
+      <p:sp>
+        <p:nvSpPr>
+          <p:cNvPr id="93" name="Rectangle 92">
+            <a:extLst>
+              <a:ext uri="{FF2B5EF4-FFF2-40B4-BE49-F238E27FC236}">
+                <a16:creationId xmlns:a16="http://schemas.microsoft.com/office/drawing/2014/main" id="{F45FFAA4-008B-4046-BEFF-C8399F0FA25A}"/>
+              </a:ext>
+            </a:extLst>
+          </p:cNvPr>
+          <p:cNvSpPr/>
+          <p:nvPr/>
+        </p:nvSpPr>
+        <p:spPr>
+          <a:xfrm>
+            <a:off x="7399034" y="4740085"/>
+            <a:ext cx="510589" cy="711200"/>
+          </a:xfrm>
+          <a:prstGeom prst="rect">
+            <a:avLst/>
+          </a:prstGeom>
+        </p:spPr>
+        <p:style>
+          <a:lnRef idx="2">
+            <a:schemeClr val="accent1">
+              <a:shade val="50000"/>
+            </a:schemeClr>
+          </a:lnRef>
+          <a:fillRef idx="1">
+            <a:schemeClr val="accent1"/>
+          </a:fillRef>
+          <a:effectRef idx="0">
+            <a:schemeClr val="accent1"/>
+          </a:effectRef>
+          <a:fontRef idx="minor">
+            <a:schemeClr val="lt1"/>
+          </a:fontRef>
+        </p:style>
+        <p:txBody>
+          <a:bodyPr rtlCol="0" anchor="ctr"/>
+          <a:lstStyle/>
+          <a:p>
+            <a:pPr algn="ctr"/>
+            <a:r>
+              <a:rPr lang="en-GB"/>
+              <a:t>2</a:t>
+            </a:r>
+          </a:p>
+        </p:txBody>
+      </p:sp>
+      <p:sp>
+        <p:nvSpPr>
+          <p:cNvPr id="94" name="Rectangle 93">
+            <a:extLst>
+              <a:ext uri="{FF2B5EF4-FFF2-40B4-BE49-F238E27FC236}">
+                <a16:creationId xmlns:a16="http://schemas.microsoft.com/office/drawing/2014/main" id="{CC011139-6C3E-4507-BC36-DB993212C407}"/>
+              </a:ext>
+            </a:extLst>
+          </p:cNvPr>
+          <p:cNvSpPr/>
+          <p:nvPr/>
+        </p:nvSpPr>
+        <p:spPr>
+          <a:xfrm>
+            <a:off x="8227976" y="4740085"/>
+            <a:ext cx="510589" cy="711200"/>
+          </a:xfrm>
+          <a:prstGeom prst="rect">
+            <a:avLst/>
+          </a:prstGeom>
+        </p:spPr>
+        <p:style>
+          <a:lnRef idx="2">
+            <a:schemeClr val="accent1">
+              <a:shade val="50000"/>
+            </a:schemeClr>
+          </a:lnRef>
+          <a:fillRef idx="1">
+            <a:schemeClr val="accent1"/>
+          </a:fillRef>
+          <a:effectRef idx="0">
+            <a:schemeClr val="accent1"/>
+          </a:effectRef>
+          <a:fontRef idx="minor">
+            <a:schemeClr val="lt1"/>
+          </a:fontRef>
+        </p:style>
+        <p:txBody>
+          <a:bodyPr rtlCol="0" anchor="ctr"/>
+          <a:lstStyle/>
+          <a:p>
+            <a:pPr algn="ctr"/>
+            <a:r>
+              <a:rPr lang="en-GB"/>
+              <a:t>3</a:t>
+            </a:r>
+          </a:p>
+        </p:txBody>
+      </p:sp>
+      <p:cxnSp>
+        <p:nvCxnSpPr>
+          <p:cNvPr id="98" name="Straight Arrow Connector 97">
+            <a:extLst>
+              <a:ext uri="{FF2B5EF4-FFF2-40B4-BE49-F238E27FC236}">
+                <a16:creationId xmlns:a16="http://schemas.microsoft.com/office/drawing/2014/main" id="{8BE9A7A7-AAD3-4B3E-9078-B8DF94D2BA44}"/>
+              </a:ext>
+            </a:extLst>
+          </p:cNvPr>
+          <p:cNvCxnSpPr>
+            <a:cxnSpLocks/>
+          </p:cNvCxnSpPr>
+          <p:nvPr/>
+        </p:nvCxnSpPr>
+        <p:spPr>
+          <a:xfrm>
+            <a:off x="7226729" y="1367911"/>
+            <a:ext cx="597964" cy="2255222"/>
+          </a:xfrm>
+          <a:prstGeom prst="straightConnector1">
+            <a:avLst/>
+          </a:prstGeom>
+          <a:ln w="76200">
+            <a:solidFill>
+              <a:srgbClr val="FF0000"/>
+            </a:solidFill>
+            <a:tailEnd type="triangle"/>
+          </a:ln>
+        </p:spPr>
+        <p:style>
+          <a:lnRef idx="1">
+            <a:schemeClr val="accent1"/>
+          </a:lnRef>
+          <a:fillRef idx="0">
+            <a:schemeClr val="accent1"/>
+          </a:fillRef>
+          <a:effectRef idx="0">
+            <a:schemeClr val="accent1"/>
+          </a:effectRef>
+          <a:fontRef idx="minor">
+            <a:schemeClr val="tx1"/>
+          </a:fontRef>
+        </p:style>
+      </p:cxnSp>
+      <p:sp>
+        <p:nvSpPr>
+          <p:cNvPr id="101" name="Rectangle 100">
+            <a:extLst>
+              <a:ext uri="{FF2B5EF4-FFF2-40B4-BE49-F238E27FC236}">
+                <a16:creationId xmlns:a16="http://schemas.microsoft.com/office/drawing/2014/main" id="{683B7AB0-08FC-4C0E-9EB7-6CA34391F9E4}"/>
+              </a:ext>
+            </a:extLst>
+          </p:cNvPr>
+          <p:cNvSpPr/>
+          <p:nvPr/>
+        </p:nvSpPr>
+        <p:spPr>
+          <a:xfrm>
+            <a:off x="4083265" y="46678"/>
+            <a:ext cx="3315768" cy="174400"/>
+          </a:xfrm>
+          <a:prstGeom prst="rect">
+            <a:avLst/>
+          </a:prstGeom>
+          <a:solidFill>
+            <a:schemeClr val="accent6">
+              <a:lumMod val="40000"/>
+              <a:lumOff val="60000"/>
+            </a:schemeClr>
+          </a:solidFill>
+        </p:spPr>
+        <p:style>
+          <a:lnRef idx="2">
+            <a:schemeClr val="dk1"/>
+          </a:lnRef>
+          <a:fillRef idx="1">
+            <a:schemeClr val="lt1"/>
+          </a:fillRef>
+          <a:effectRef idx="0">
+            <a:schemeClr val="dk1"/>
+          </a:effectRef>
+          <a:fontRef idx="minor">
+            <a:schemeClr val="dk1"/>
+          </a:fontRef>
+        </p:style>
+        <p:txBody>
+          <a:bodyPr rtlCol="0" anchor="ctr"/>
+          <a:lstStyle/>
+          <a:p>
+            <a:pPr algn="ctr"/>
+            <a:r>
+              <a:rPr lang="en-GB" sz="1050"/>
+              <a:t>Cache: {pos:blue_3, {card:stoat, power:1, health:2}}</a:t>
+            </a:r>
+          </a:p>
+        </p:txBody>
+      </p:sp>
+      <p:sp>
+        <p:nvSpPr>
+          <p:cNvPr id="102" name="Rectangle 101">
+            <a:extLst>
+              <a:ext uri="{FF2B5EF4-FFF2-40B4-BE49-F238E27FC236}">
+                <a16:creationId xmlns:a16="http://schemas.microsoft.com/office/drawing/2014/main" id="{3F41E80D-1E1D-44E4-94C5-8CEFA3C7E4DC}"/>
+              </a:ext>
+            </a:extLst>
+          </p:cNvPr>
+          <p:cNvSpPr/>
+          <p:nvPr/>
+        </p:nvSpPr>
+        <p:spPr>
+          <a:xfrm>
+            <a:off x="1688112" y="-12036"/>
+            <a:ext cx="704710" cy="233114"/>
+          </a:xfrm>
+          <a:prstGeom prst="rect">
+            <a:avLst/>
+          </a:prstGeom>
+          <a:solidFill>
+            <a:schemeClr val="accent6">
+              <a:lumMod val="40000"/>
+              <a:lumOff val="60000"/>
+            </a:schemeClr>
+          </a:solidFill>
+        </p:spPr>
+        <p:style>
+          <a:lnRef idx="2">
+            <a:schemeClr val="dk1"/>
+          </a:lnRef>
+          <a:fillRef idx="1">
+            <a:schemeClr val="lt1"/>
+          </a:fillRef>
+          <a:effectRef idx="0">
+            <a:schemeClr val="dk1"/>
+          </a:effectRef>
+          <a:fontRef idx="minor">
+            <a:schemeClr val="dk1"/>
+          </a:fontRef>
+        </p:style>
+        <p:txBody>
+          <a:bodyPr rtlCol="0" anchor="ctr"/>
+          <a:lstStyle/>
+          <a:p>
+            <a:pPr algn="ctr"/>
+            <a:r>
+              <a:rPr lang="en-GB" sz="1050"/>
+              <a:t>Cache: {}</a:t>
+            </a:r>
+          </a:p>
+        </p:txBody>
+      </p:sp>
+      <p:sp>
+        <p:nvSpPr>
+          <p:cNvPr id="103" name="Rectangle 102">
+            <a:extLst>
+              <a:ext uri="{FF2B5EF4-FFF2-40B4-BE49-F238E27FC236}">
+                <a16:creationId xmlns:a16="http://schemas.microsoft.com/office/drawing/2014/main" id="{E5309311-0C39-4DB1-B07A-DAE68BC470DB}"/>
+              </a:ext>
+            </a:extLst>
+          </p:cNvPr>
+          <p:cNvSpPr/>
+          <p:nvPr/>
+        </p:nvSpPr>
+        <p:spPr>
+          <a:xfrm>
+            <a:off x="9447780" y="6774"/>
+            <a:ext cx="858448" cy="214304"/>
+          </a:xfrm>
+          <a:prstGeom prst="rect">
+            <a:avLst/>
+          </a:prstGeom>
+          <a:solidFill>
+            <a:schemeClr val="accent6">
+              <a:lumMod val="40000"/>
+              <a:lumOff val="60000"/>
+            </a:schemeClr>
+          </a:solidFill>
+        </p:spPr>
+        <p:style>
+          <a:lnRef idx="2">
+            <a:schemeClr val="dk1"/>
+          </a:lnRef>
+          <a:fillRef idx="1">
+            <a:schemeClr val="lt1"/>
+          </a:fillRef>
+          <a:effectRef idx="0">
+            <a:schemeClr val="dk1"/>
+          </a:effectRef>
+          <a:fontRef idx="minor">
+            <a:schemeClr val="dk1"/>
+          </a:fontRef>
+        </p:style>
+        <p:txBody>
+          <a:bodyPr rtlCol="0" anchor="ctr"/>
+          <a:lstStyle/>
+          <a:p>
+            <a:pPr algn="ctr"/>
+            <a:r>
+              <a:rPr lang="en-GB" sz="1050"/>
+              <a:t>Cache: {}</a:t>
+            </a:r>
+          </a:p>
+        </p:txBody>
+      </p:sp>
+      <p:sp>
+        <p:nvSpPr>
+          <p:cNvPr id="104" name="Rectangle 103">
+            <a:extLst>
+              <a:ext uri="{FF2B5EF4-FFF2-40B4-BE49-F238E27FC236}">
+                <a16:creationId xmlns:a16="http://schemas.microsoft.com/office/drawing/2014/main" id="{9C11B404-A3B6-47F3-9884-250FF82CDB92}"/>
+              </a:ext>
+            </a:extLst>
+          </p:cNvPr>
+          <p:cNvSpPr/>
+          <p:nvPr/>
+        </p:nvSpPr>
+        <p:spPr>
+          <a:xfrm>
+            <a:off x="7250250" y="3481754"/>
+            <a:ext cx="756880" cy="226909"/>
+          </a:xfrm>
+          <a:prstGeom prst="rect">
+            <a:avLst/>
+          </a:prstGeom>
+          <a:solidFill>
+            <a:schemeClr val="accent6">
+              <a:lumMod val="40000"/>
+              <a:lumOff val="60000"/>
+            </a:schemeClr>
+          </a:solidFill>
+        </p:spPr>
+        <p:style>
+          <a:lnRef idx="2">
+            <a:schemeClr val="dk1"/>
+          </a:lnRef>
+          <a:fillRef idx="1">
+            <a:schemeClr val="lt1"/>
+          </a:fillRef>
+          <a:effectRef idx="0">
+            <a:schemeClr val="dk1"/>
+          </a:effectRef>
+          <a:fontRef idx="minor">
+            <a:schemeClr val="dk1"/>
+          </a:fontRef>
+        </p:style>
+        <p:txBody>
+          <a:bodyPr rtlCol="0" anchor="ctr"/>
+          <a:lstStyle/>
+          <a:p>
+            <a:pPr algn="ctr"/>
+            <a:r>
+              <a:rPr lang="en-GB" sz="1050"/>
+              <a:t>Cache: {}</a:t>
+            </a:r>
+          </a:p>
+        </p:txBody>
+      </p:sp>
+    </p:spTree>
+    <p:extLst>
+      <p:ext uri="{BB962C8B-B14F-4D97-AF65-F5344CB8AC3E}">
+        <p14:creationId xmlns:p14="http://schemas.microsoft.com/office/powerpoint/2010/main" val="1326166152"/>
+      </p:ext>
+    </p:extLst>
+  </p:cSld>
+  <p:clrMapOvr>
+    <a:masterClrMapping/>
+  </p:clrMapOvr>
+</p:sld>
+</file>
+
 <file path=ppt/theme/theme1.xml><?xml version="1.0" encoding="utf-8"?>
 <a:theme xmlns:a="http://schemas.openxmlformats.org/drawingml/2006/main" name="Office Theme">
   <a:themeElements>

</xml_diff>